<commit_message>
Elso gyakorlat par javitas
</commit_message>
<xml_diff>
--- a/Gyakorlatok/01/Rendszerelmelet_Gyakorlat_01.pptx
+++ b/Gyakorlatok/01/Rendszerelmelet_Gyakorlat_01.pptx
@@ -141,7 +141,7 @@
 <file path=ppt/revisionInfo.xml><?xml version="1.0" encoding="utf-8"?>
 <p1510:revInfo xmlns:a="http://schemas.openxmlformats.org/drawingml/2006/main" xmlns:r="http://schemas.openxmlformats.org/officeDocument/2006/relationships" xmlns:p1510="http://schemas.microsoft.com/office/powerpoint/2015/10/main">
   <p1510:revLst>
-    <p1510:client id="{005D504A-7EB7-437D-8DF0-5BD18C455719}" v="1161" dt="2022-09-13T17:40:42.551"/>
+    <p1510:client id="{6018F06A-0F64-47D1-92CA-CF863A08DA92}" v="46" dt="2022-09-15T15:19:31.013"/>
   </p1510:revLst>
 </p1510:revInfo>
 </file>
@@ -151,7 +151,7 @@
   <pc:docChgLst>
     <pc:chgData name="Dániel Skriba" userId="2fbddc5d-4953-4cbb-9f6e-36393a123619" providerId="ADAL" clId="{6018F06A-0F64-47D1-92CA-CF863A08DA92}"/>
     <pc:docChg chg="undo custSel addSld delSld modSld">
-      <pc:chgData name="Dániel Skriba" userId="2fbddc5d-4953-4cbb-9f6e-36393a123619" providerId="ADAL" clId="{6018F06A-0F64-47D1-92CA-CF863A08DA92}" dt="2022-09-08T12:48:40.567" v="3566" actId="20577"/>
+      <pc:chgData name="Dániel Skriba" userId="2fbddc5d-4953-4cbb-9f6e-36393a123619" providerId="ADAL" clId="{6018F06A-0F64-47D1-92CA-CF863A08DA92}" dt="2022-09-15T15:19:31.013" v="3616" actId="20577"/>
       <pc:docMkLst>
         <pc:docMk/>
       </pc:docMkLst>
@@ -286,12 +286,20 @@
           </ac:spMkLst>
         </pc:spChg>
       </pc:sldChg>
-      <pc:sldChg chg="modAnim">
-        <pc:chgData name="Dániel Skriba" userId="2fbddc5d-4953-4cbb-9f6e-36393a123619" providerId="ADAL" clId="{6018F06A-0F64-47D1-92CA-CF863A08DA92}" dt="2022-09-08T12:09:22.629" v="3445"/>
+      <pc:sldChg chg="delSp mod delAnim modAnim">
+        <pc:chgData name="Dániel Skriba" userId="2fbddc5d-4953-4cbb-9f6e-36393a123619" providerId="ADAL" clId="{6018F06A-0F64-47D1-92CA-CF863A08DA92}" dt="2022-09-15T11:51:42.122" v="3567" actId="478"/>
         <pc:sldMkLst>
           <pc:docMk/>
           <pc:sldMk cId="1049197117" sldId="265"/>
         </pc:sldMkLst>
+        <pc:spChg chg="del">
+          <ac:chgData name="Dániel Skriba" userId="2fbddc5d-4953-4cbb-9f6e-36393a123619" providerId="ADAL" clId="{6018F06A-0F64-47D1-92CA-CF863A08DA92}" dt="2022-09-15T11:51:42.122" v="3567" actId="478"/>
+          <ac:spMkLst>
+            <pc:docMk/>
+            <pc:sldMk cId="1049197117" sldId="265"/>
+            <ac:spMk id="4" creationId="{37AE0294-041D-D655-381B-1D0459D70EA8}"/>
+          </ac:spMkLst>
+        </pc:spChg>
       </pc:sldChg>
       <pc:sldChg chg="modAnim">
         <pc:chgData name="Dániel Skriba" userId="2fbddc5d-4953-4cbb-9f6e-36393a123619" providerId="ADAL" clId="{6018F06A-0F64-47D1-92CA-CF863A08DA92}" dt="2022-09-08T12:09:29.778" v="3446"/>
@@ -300,12 +308,28 @@
           <pc:sldMk cId="4068863513" sldId="266"/>
         </pc:sldMkLst>
       </pc:sldChg>
-      <pc:sldChg chg="modAnim">
-        <pc:chgData name="Dániel Skriba" userId="2fbddc5d-4953-4cbb-9f6e-36393a123619" providerId="ADAL" clId="{6018F06A-0F64-47D1-92CA-CF863A08DA92}" dt="2022-09-08T12:09:39.356" v="3447"/>
+      <pc:sldChg chg="delSp modSp mod delAnim modAnim">
+        <pc:chgData name="Dániel Skriba" userId="2fbddc5d-4953-4cbb-9f6e-36393a123619" providerId="ADAL" clId="{6018F06A-0F64-47D1-92CA-CF863A08DA92}" dt="2022-09-15T15:19:31.013" v="3616" actId="20577"/>
         <pc:sldMkLst>
           <pc:docMk/>
           <pc:sldMk cId="3227530260" sldId="267"/>
         </pc:sldMkLst>
+        <pc:spChg chg="mod">
+          <ac:chgData name="Dániel Skriba" userId="2fbddc5d-4953-4cbb-9f6e-36393a123619" providerId="ADAL" clId="{6018F06A-0F64-47D1-92CA-CF863A08DA92}" dt="2022-09-15T15:19:31.013" v="3616" actId="20577"/>
+          <ac:spMkLst>
+            <pc:docMk/>
+            <pc:sldMk cId="3227530260" sldId="267"/>
+            <ac:spMk id="3" creationId="{B386F19B-3213-779A-B2D7-11BDE5BF55F7}"/>
+          </ac:spMkLst>
+        </pc:spChg>
+        <pc:spChg chg="del mod">
+          <ac:chgData name="Dániel Skriba" userId="2fbddc5d-4953-4cbb-9f6e-36393a123619" providerId="ADAL" clId="{6018F06A-0F64-47D1-92CA-CF863A08DA92}" dt="2022-09-15T15:16:40.220" v="3569" actId="478"/>
+          <ac:spMkLst>
+            <pc:docMk/>
+            <pc:sldMk cId="3227530260" sldId="267"/>
+            <ac:spMk id="4" creationId="{1DBC063A-AF13-F52D-D8AA-2F3C67083B85}"/>
+          </ac:spMkLst>
+        </pc:spChg>
       </pc:sldChg>
       <pc:sldChg chg="modAnim">
         <pc:chgData name="Dániel Skriba" userId="2fbddc5d-4953-4cbb-9f6e-36393a123619" providerId="ADAL" clId="{6018F06A-0F64-47D1-92CA-CF863A08DA92}" dt="2022-09-08T12:09:45.340" v="3448"/>
@@ -921,7 +945,7 @@
           <a:p>
             <a:fld id="{F4F0FC57-EDB1-4BE7-B03E-B12252152F0E}" type="datetimeFigureOut">
               <a:rPr lang="hu-HU" smtClean="0"/>
-              <a:t>2022. 09. 13.</a:t>
+              <a:t>2022. 09. 15.</a:t>
             </a:fld>
             <a:endParaRPr lang="hu-HU"/>
           </a:p>
@@ -6776,60 +6800,6 @@
           </p:sp>
         </mc:Fallback>
       </mc:AlternateContent>
-      <p:sp>
-        <p:nvSpPr>
-          <p:cNvPr id="4" name="Téglalap 3">
-            <a:extLst>
-              <a:ext uri="{FF2B5EF4-FFF2-40B4-BE49-F238E27FC236}">
-                <a16:creationId xmlns:a16="http://schemas.microsoft.com/office/drawing/2014/main" id="{37AE0294-041D-D655-381B-1D0459D70EA8}"/>
-              </a:ext>
-            </a:extLst>
-          </p:cNvPr>
-          <p:cNvSpPr/>
-          <p:nvPr/>
-        </p:nvSpPr>
-        <p:spPr>
-          <a:xfrm>
-            <a:off x="2691829" y="1345915"/>
-            <a:ext cx="1582220" cy="575352"/>
-          </a:xfrm>
-          <a:prstGeom prst="rect">
-            <a:avLst/>
-          </a:prstGeom>
-          <a:solidFill>
-            <a:schemeClr val="bg1"/>
-          </a:solidFill>
-          <a:ln>
-            <a:solidFill>
-              <a:schemeClr val="bg1"/>
-            </a:solidFill>
-          </a:ln>
-        </p:spPr>
-        <p:style>
-          <a:lnRef idx="2">
-            <a:schemeClr val="accent1">
-              <a:shade val="50000"/>
-            </a:schemeClr>
-          </a:lnRef>
-          <a:fillRef idx="1">
-            <a:schemeClr val="accent1"/>
-          </a:fillRef>
-          <a:effectRef idx="0">
-            <a:schemeClr val="accent1"/>
-          </a:effectRef>
-          <a:fontRef idx="minor">
-            <a:schemeClr val="lt1"/>
-          </a:fontRef>
-        </p:style>
-        <p:txBody>
-          <a:bodyPr rtlCol="0" anchor="ctr"/>
-          <a:lstStyle/>
-          <a:p>
-            <a:pPr algn="ctr"/>
-            <a:endParaRPr lang="hu-HU"/>
-          </a:p>
-        </p:txBody>
-      </p:sp>
       <p:pic>
         <p:nvPicPr>
           <p:cNvPr id="6" name="Kép 5">
@@ -6976,7 +6946,7 @@
                             </p:stCondLst>
                             <p:childTnLst>
                               <p:par>
-                                <p:cTn id="5" presetID="1" presetClass="exit" presetSubtype="0" fill="hold" grpId="0" nodeType="clickEffect">
+                                <p:cTn id="5" presetID="1" presetClass="entr" presetSubtype="0" fill="hold" nodeType="clickEffect">
                                   <p:stCondLst>
                                     <p:cond delay="0"/>
                                   </p:stCondLst>
@@ -6984,51 +6954,6 @@
                                     <p:set>
                                       <p:cBhvr>
                                         <p:cTn id="6" dur="1" fill="hold">
-                                          <p:stCondLst>
-                                            <p:cond delay="0"/>
-                                          </p:stCondLst>
-                                        </p:cTn>
-                                        <p:tgtEl>
-                                          <p:spTgt spid="4"/>
-                                        </p:tgtEl>
-                                        <p:attrNameLst>
-                                          <p:attrName>style.visibility</p:attrName>
-                                        </p:attrNameLst>
-                                      </p:cBhvr>
-                                      <p:to>
-                                        <p:strVal val="hidden"/>
-                                      </p:to>
-                                    </p:set>
-                                  </p:childTnLst>
-                                </p:cTn>
-                              </p:par>
-                            </p:childTnLst>
-                          </p:cTn>
-                        </p:par>
-                      </p:childTnLst>
-                    </p:cTn>
-                  </p:par>
-                  <p:par>
-                    <p:cTn id="7" fill="hold">
-                      <p:stCondLst>
-                        <p:cond delay="indefinite"/>
-                      </p:stCondLst>
-                      <p:childTnLst>
-                        <p:par>
-                          <p:cTn id="8" fill="hold">
-                            <p:stCondLst>
-                              <p:cond delay="0"/>
-                            </p:stCondLst>
-                            <p:childTnLst>
-                              <p:par>
-                                <p:cTn id="9" presetID="1" presetClass="entr" presetSubtype="0" fill="hold" nodeType="clickEffect">
-                                  <p:stCondLst>
-                                    <p:cond delay="0"/>
-                                  </p:stCondLst>
-                                  <p:childTnLst>
-                                    <p:set>
-                                      <p:cBhvr>
-                                        <p:cTn id="10" dur="1" fill="hold">
                                           <p:stCondLst>
                                             <p:cond delay="0"/>
                                           </p:stCondLst>
@@ -7074,9 +6999,6 @@
         </p:cTn>
       </p:par>
     </p:tnLst>
-    <p:bldLst>
-      <p:bldP spid="4" grpId="0" animBg="1"/>
-    </p:bldLst>
   </p:timing>
 </p:sld>
 </file>
@@ -8089,8 +8011,8 @@
           </a:p>
         </p:txBody>
       </p:sp>
-      <mc:AlternateContent xmlns:mc="http://schemas.openxmlformats.org/markup-compatibility/2006" xmlns:a14="http://schemas.microsoft.com/office/drawing/2010/main">
-        <mc:Choice Requires="a14">
+      <mc:AlternateContent xmlns:mc="http://schemas.openxmlformats.org/markup-compatibility/2006">
+        <mc:Choice xmlns:a14="http://schemas.microsoft.com/office/drawing/2010/main" Requires="a14">
           <p:sp>
             <p:nvSpPr>
               <p:cNvPr id="3" name="Tartalom helye 2">
@@ -8357,12 +8279,167 @@
                     </m:oMath>
                   </m:oMathPara>
                 </a14:m>
+                <a:endParaRPr lang="hu-HU" b="0" dirty="0"/>
+              </a:p>
+              <a:p>
+                <a:pPr marL="0" indent="0">
+                  <a:spcAft>
+                    <a:spcPts val="1200"/>
+                  </a:spcAft>
+                  <a:buNone/>
+                </a:pPr>
+                <a14:m>
+                  <m:oMathPara xmlns:m="http://schemas.openxmlformats.org/officeDocument/2006/math">
+                    <m:oMathParaPr>
+                      <m:jc m:val="left"/>
+                    </m:oMathParaPr>
+                    <m:oMath xmlns:m="http://schemas.openxmlformats.org/officeDocument/2006/math">
+                      <m:sSub>
+                        <m:sSubPr>
+                          <m:ctrlPr>
+                            <a:rPr lang="hu-HU" b="0" i="1" smtClean="0">
+                              <a:latin typeface="Cambria Math" panose="02040503050406030204" pitchFamily="18" charset="0"/>
+                            </a:rPr>
+                          </m:ctrlPr>
+                        </m:sSubPr>
+                        <m:e>
+                          <m:r>
+                            <a:rPr lang="hu-HU" b="0" i="1" smtClean="0">
+                              <a:latin typeface="Cambria Math" panose="02040503050406030204" pitchFamily="18" charset="0"/>
+                            </a:rPr>
+                            <m:t>𝑥</m:t>
+                          </m:r>
+                        </m:e>
+                        <m:sub>
+                          <m:r>
+                            <a:rPr lang="hu-HU" b="0" i="1" smtClean="0">
+                              <a:latin typeface="Cambria Math" panose="02040503050406030204" pitchFamily="18" charset="0"/>
+                            </a:rPr>
+                            <m:t>3</m:t>
+                          </m:r>
+                        </m:sub>
+                      </m:sSub>
+                      <m:d>
+                        <m:dPr>
+                          <m:begChr m:val="["/>
+                          <m:endChr m:val="]"/>
+                          <m:ctrlPr>
+                            <a:rPr lang="hu-HU" b="0" i="1" smtClean="0">
+                              <a:latin typeface="Cambria Math" panose="02040503050406030204" pitchFamily="18" charset="0"/>
+                            </a:rPr>
+                          </m:ctrlPr>
+                        </m:dPr>
+                        <m:e>
+                          <m:r>
+                            <a:rPr lang="hu-HU" b="0" i="1" smtClean="0">
+                              <a:latin typeface="Cambria Math" panose="02040503050406030204" pitchFamily="18" charset="0"/>
+                            </a:rPr>
+                            <m:t>𝑘</m:t>
+                          </m:r>
+                        </m:e>
+                      </m:d>
+                      <m:r>
+                        <a:rPr lang="hu-HU" b="0" i="1" smtClean="0">
+                          <a:latin typeface="Cambria Math" panose="02040503050406030204" pitchFamily="18" charset="0"/>
+                        </a:rPr>
+                        <m:t>^=</m:t>
+                      </m:r>
+                      <m:sSup>
+                        <m:sSupPr>
+                          <m:ctrlPr>
+                            <a:rPr lang="hu-HU" b="0" i="1" smtClean="0">
+                              <a:latin typeface="Cambria Math" panose="02040503050406030204" pitchFamily="18" charset="0"/>
+                            </a:rPr>
+                          </m:ctrlPr>
+                        </m:sSupPr>
+                        <m:e>
+                          <m:r>
+                            <a:rPr lang="hu-HU" b="0" i="1" smtClean="0">
+                              <a:latin typeface="Cambria Math" panose="02040503050406030204" pitchFamily="18" charset="0"/>
+                            </a:rPr>
+                            <m:t>0,5</m:t>
+                          </m:r>
+                        </m:e>
+                        <m:sup>
+                          <m:r>
+                            <a:rPr lang="hu-HU" b="0" i="1" smtClean="0">
+                              <a:latin typeface="Cambria Math" panose="02040503050406030204" pitchFamily="18" charset="0"/>
+                            </a:rPr>
+                            <m:t>2</m:t>
+                          </m:r>
+                        </m:sup>
+                      </m:sSup>
+                      <m:r>
+                        <a:rPr lang="hu-HU" b="0" i="1" smtClean="0">
+                          <a:latin typeface="Cambria Math" panose="02040503050406030204" pitchFamily="18" charset="0"/>
+                        </a:rPr>
+                        <m:t>𝜀</m:t>
+                      </m:r>
+                      <m:d>
+                        <m:dPr>
+                          <m:begChr m:val="["/>
+                          <m:endChr m:val="]"/>
+                          <m:ctrlPr>
+                            <a:rPr lang="hu-HU" b="0" i="1" smtClean="0">
+                              <a:latin typeface="Cambria Math" panose="02040503050406030204" pitchFamily="18" charset="0"/>
+                            </a:rPr>
+                          </m:ctrlPr>
+                        </m:dPr>
+                        <m:e>
+                          <m:r>
+                            <a:rPr lang="hu-HU" b="0" i="1" smtClean="0">
+                              <a:latin typeface="Cambria Math" panose="02040503050406030204" pitchFamily="18" charset="0"/>
+                            </a:rPr>
+                            <m:t>𝑘</m:t>
+                          </m:r>
+                          <m:r>
+                            <a:rPr lang="hu-HU" b="0" i="1" smtClean="0">
+                              <a:latin typeface="Cambria Math" panose="02040503050406030204" pitchFamily="18" charset="0"/>
+                            </a:rPr>
+                            <m:t>−2</m:t>
+                          </m:r>
+                        </m:e>
+                      </m:d>
+                      <m:sSup>
+                        <m:sSupPr>
+                          <m:ctrlPr>
+                            <a:rPr lang="hu-HU" b="0" i="1" smtClean="0">
+                              <a:latin typeface="Cambria Math" panose="02040503050406030204" pitchFamily="18" charset="0"/>
+                            </a:rPr>
+                          </m:ctrlPr>
+                        </m:sSupPr>
+                        <m:e>
+                          <m:r>
+                            <a:rPr lang="hu-HU" b="0" i="1" smtClean="0">
+                              <a:latin typeface="Cambria Math" panose="02040503050406030204" pitchFamily="18" charset="0"/>
+                            </a:rPr>
+                            <m:t>0,5</m:t>
+                          </m:r>
+                        </m:e>
+                        <m:sup>
+                          <m:r>
+                            <a:rPr lang="hu-HU" b="0" i="1" smtClean="0">
+                              <a:latin typeface="Cambria Math" panose="02040503050406030204" pitchFamily="18" charset="0"/>
+                            </a:rPr>
+                            <m:t>𝑘</m:t>
+                          </m:r>
+                          <m:r>
+                            <a:rPr lang="hu-HU" b="0" i="1" smtClean="0">
+                              <a:latin typeface="Cambria Math" panose="02040503050406030204" pitchFamily="18" charset="0"/>
+                            </a:rPr>
+                            <m:t>−2</m:t>
+                          </m:r>
+                        </m:sup>
+                      </m:sSup>
+                    </m:oMath>
+                  </m:oMathPara>
+                </a14:m>
                 <a:endParaRPr lang="hu-HU" dirty="0"/>
               </a:p>
             </p:txBody>
           </p:sp>
         </mc:Choice>
-        <mc:Fallback xmlns="">
+        <mc:Fallback>
           <p:sp>
             <p:nvSpPr>
               <p:cNvPr id="3" name="Tartalom helye 2">
@@ -8402,60 +8479,6 @@
           </p:sp>
         </mc:Fallback>
       </mc:AlternateContent>
-      <p:sp>
-        <p:nvSpPr>
-          <p:cNvPr id="4" name="Téglalap 3">
-            <a:extLst>
-              <a:ext uri="{FF2B5EF4-FFF2-40B4-BE49-F238E27FC236}">
-                <a16:creationId xmlns:a16="http://schemas.microsoft.com/office/drawing/2014/main" id="{1DBC063A-AF13-F52D-D8AA-2F3C67083B85}"/>
-              </a:ext>
-            </a:extLst>
-          </p:cNvPr>
-          <p:cNvSpPr/>
-          <p:nvPr/>
-        </p:nvSpPr>
-        <p:spPr>
-          <a:xfrm>
-            <a:off x="2722652" y="1314499"/>
-            <a:ext cx="1972638" cy="575352"/>
-          </a:xfrm>
-          <a:prstGeom prst="rect">
-            <a:avLst/>
-          </a:prstGeom>
-          <a:solidFill>
-            <a:schemeClr val="bg1"/>
-          </a:solidFill>
-          <a:ln>
-            <a:solidFill>
-              <a:schemeClr val="bg1"/>
-            </a:solidFill>
-          </a:ln>
-        </p:spPr>
-        <p:style>
-          <a:lnRef idx="2">
-            <a:schemeClr val="accent1">
-              <a:shade val="50000"/>
-            </a:schemeClr>
-          </a:lnRef>
-          <a:fillRef idx="1">
-            <a:schemeClr val="accent1"/>
-          </a:fillRef>
-          <a:effectRef idx="0">
-            <a:schemeClr val="accent1"/>
-          </a:effectRef>
-          <a:fontRef idx="minor">
-            <a:schemeClr val="lt1"/>
-          </a:fontRef>
-        </p:style>
-        <p:txBody>
-          <a:bodyPr rtlCol="0" anchor="ctr"/>
-          <a:lstStyle/>
-          <a:p>
-            <a:pPr algn="ctr"/>
-            <a:endParaRPr lang="hu-HU"/>
-          </a:p>
-        </p:txBody>
-      </p:sp>
       <p:pic>
         <p:nvPicPr>
           <p:cNvPr id="6" name="Kép 5">
@@ -8602,7 +8625,7 @@
                             </p:stCondLst>
                             <p:childTnLst>
                               <p:par>
-                                <p:cTn id="5" presetID="1" presetClass="exit" presetSubtype="0" fill="hold" grpId="0" nodeType="clickEffect">
+                                <p:cTn id="5" presetID="1" presetClass="entr" presetSubtype="0" fill="hold" nodeType="clickEffect">
                                   <p:stCondLst>
                                     <p:cond delay="0"/>
                                   </p:stCondLst>
@@ -8610,51 +8633,6 @@
                                     <p:set>
                                       <p:cBhvr>
                                         <p:cTn id="6" dur="1" fill="hold">
-                                          <p:stCondLst>
-                                            <p:cond delay="0"/>
-                                          </p:stCondLst>
-                                        </p:cTn>
-                                        <p:tgtEl>
-                                          <p:spTgt spid="4"/>
-                                        </p:tgtEl>
-                                        <p:attrNameLst>
-                                          <p:attrName>style.visibility</p:attrName>
-                                        </p:attrNameLst>
-                                      </p:cBhvr>
-                                      <p:to>
-                                        <p:strVal val="hidden"/>
-                                      </p:to>
-                                    </p:set>
-                                  </p:childTnLst>
-                                </p:cTn>
-                              </p:par>
-                            </p:childTnLst>
-                          </p:cTn>
-                        </p:par>
-                      </p:childTnLst>
-                    </p:cTn>
-                  </p:par>
-                  <p:par>
-                    <p:cTn id="7" fill="hold">
-                      <p:stCondLst>
-                        <p:cond delay="indefinite"/>
-                      </p:stCondLst>
-                      <p:childTnLst>
-                        <p:par>
-                          <p:cTn id="8" fill="hold">
-                            <p:stCondLst>
-                              <p:cond delay="0"/>
-                            </p:stCondLst>
-                            <p:childTnLst>
-                              <p:par>
-                                <p:cTn id="9" presetID="1" presetClass="entr" presetSubtype="0" fill="hold" nodeType="clickEffect">
-                                  <p:stCondLst>
-                                    <p:cond delay="0"/>
-                                  </p:stCondLst>
-                                  <p:childTnLst>
-                                    <p:set>
-                                      <p:cBhvr>
-                                        <p:cTn id="10" dur="1" fill="hold">
                                           <p:stCondLst>
                                             <p:cond delay="0"/>
                                           </p:stCondLst>
@@ -8700,9 +8678,6 @@
         </p:cTn>
       </p:par>
     </p:tnLst>
-    <p:bldLst>
-      <p:bldP spid="4" grpId="0" animBg="1"/>
-    </p:bldLst>
   </p:timing>
 </p:sld>
 </file>
@@ -15518,8 +15493,8 @@
           </a:p>
         </p:txBody>
       </p:sp>
-      <mc:AlternateContent xmlns:mc="http://schemas.openxmlformats.org/markup-compatibility/2006">
-        <mc:Choice xmlns:a14="http://schemas.microsoft.com/office/drawing/2010/main" Requires="a14">
+      <mc:AlternateContent xmlns:mc="http://schemas.openxmlformats.org/markup-compatibility/2006" xmlns:a14="http://schemas.microsoft.com/office/drawing/2010/main">
+        <mc:Choice Requires="a14">
           <p:sp>
             <p:nvSpPr>
               <p:cNvPr id="3" name="Tartalom helye 2">
@@ -16421,7 +16396,16 @@
                                         <a:rPr lang="en-GB" b="0" i="0" smtClean="0">
                                           <a:latin typeface="Cambria Math" panose="02040503050406030204" pitchFamily="18" charset="0"/>
                                         </a:rPr>
-                                        <m:t>sin</m:t>
+                                        <m:t>s</m:t>
+                                      </m:r>
+                                      <m:r>
+                                        <m:rPr>
+                                          <m:sty m:val="p"/>
+                                        </m:rPr>
+                                        <a:rPr lang="en-GB" b="0" i="0" smtClean="0">
+                                          <a:latin typeface="Cambria Math" panose="02040503050406030204" pitchFamily="18" charset="0"/>
+                                        </a:rPr>
+                                        <m:t>in</m:t>
                                       </m:r>
                                     </m:fName>
                                     <m:e>
@@ -16665,7 +16649,7 @@
             </p:txBody>
           </p:sp>
         </mc:Choice>
-        <mc:Fallback>
+        <mc:Fallback xmlns="">
           <p:sp>
             <p:nvSpPr>
               <p:cNvPr id="3" name="Tartalom helye 2">
@@ -17180,8 +17164,8 @@
           </a:p>
         </p:txBody>
       </p:sp>
-      <mc:AlternateContent xmlns:mc="http://schemas.openxmlformats.org/markup-compatibility/2006">
-        <mc:Choice xmlns:a14="http://schemas.microsoft.com/office/drawing/2010/main" Requires="a14">
+      <mc:AlternateContent xmlns:mc="http://schemas.openxmlformats.org/markup-compatibility/2006" xmlns:a14="http://schemas.microsoft.com/office/drawing/2010/main">
+        <mc:Choice Requires="a14">
           <p:sp>
             <p:nvSpPr>
               <p:cNvPr id="3" name="Tartalom helye 2">
@@ -17718,7 +17702,7 @@
             </p:txBody>
           </p:sp>
         </mc:Choice>
-        <mc:Fallback>
+        <mc:Fallback xmlns="">
           <p:sp>
             <p:nvSpPr>
               <p:cNvPr id="3" name="Tartalom helye 2">
@@ -17901,8 +17885,8 @@
           </a:p>
         </p:txBody>
       </p:sp>
-      <mc:AlternateContent xmlns:mc="http://schemas.openxmlformats.org/markup-compatibility/2006">
-        <mc:Choice xmlns:a14="http://schemas.microsoft.com/office/drawing/2010/main" Requires="a14">
+      <mc:AlternateContent xmlns:mc="http://schemas.openxmlformats.org/markup-compatibility/2006" xmlns:a14="http://schemas.microsoft.com/office/drawing/2010/main">
+        <mc:Choice Requires="a14">
           <p:sp>
             <p:nvSpPr>
               <p:cNvPr id="3" name="Tartalom helye 2">
@@ -18445,7 +18429,7 @@
             </p:txBody>
           </p:sp>
         </mc:Choice>
-        <mc:Fallback>
+        <mc:Fallback xmlns="">
           <p:sp>
             <p:nvSpPr>
               <p:cNvPr id="3" name="Tartalom helye 2">
@@ -29793,8 +29777,8 @@
           </a:p>
         </p:txBody>
       </p:sp>
-      <mc:AlternateContent xmlns:mc="http://schemas.openxmlformats.org/markup-compatibility/2006">
-        <mc:Choice xmlns:a14="http://schemas.microsoft.com/office/drawing/2010/main" Requires="a14">
+      <mc:AlternateContent xmlns:mc="http://schemas.openxmlformats.org/markup-compatibility/2006" xmlns:a14="http://schemas.microsoft.com/office/drawing/2010/main">
+        <mc:Choice Requires="a14">
           <p:sp>
             <p:nvSpPr>
               <p:cNvPr id="3" name="Tartalom helye 2">
@@ -30557,7 +30541,7 @@
             </p:txBody>
           </p:sp>
         </mc:Choice>
-        <mc:Fallback>
+        <mc:Fallback xmlns="">
           <p:sp>
             <p:nvSpPr>
               <p:cNvPr id="3" name="Tartalom helye 2">
@@ -34572,8 +34556,8 @@
           </a:p>
         </p:txBody>
       </p:sp>
-      <mc:AlternateContent xmlns:mc="http://schemas.openxmlformats.org/markup-compatibility/2006">
-        <mc:Choice xmlns:a14="http://schemas.microsoft.com/office/drawing/2010/main" Requires="a14">
+      <mc:AlternateContent xmlns:mc="http://schemas.openxmlformats.org/markup-compatibility/2006" xmlns:a14="http://schemas.microsoft.com/office/drawing/2010/main">
+        <mc:Choice Requires="a14">
           <p:sp>
             <p:nvSpPr>
               <p:cNvPr id="3" name="Tartalom helye 2">
@@ -34890,7 +34874,7 @@
             </p:txBody>
           </p:sp>
         </mc:Choice>
-        <mc:Fallback>
+        <mc:Fallback xmlns="">
           <p:sp>
             <p:nvSpPr>
               <p:cNvPr id="3" name="Tartalom helye 2">

</xml_diff>